<commit_message>
Post session code from React1
</commit_message>
<xml_diff>
--- a/React1/React_Intro.pptx
+++ b/React1/React_Intro.pptx
@@ -4667,7 +4667,7 @@
         <a:lstStyle/>
         <a:p>
           <a:r>
-            <a:rPr lang="en-US"/>
+            <a:rPr lang="en-US" dirty="0"/>
             <a:t>React?</a:t>
           </a:r>
         </a:p>
@@ -5021,7 +5021,7 @@
         <a:lstStyle/>
         <a:p>
           <a:r>
-            <a:rPr lang="en-US"/>
+            <a:rPr lang="en-US" dirty="0"/>
             <a:t>At Least</a:t>
           </a:r>
         </a:p>
@@ -5057,7 +5057,7 @@
         <a:lstStyle/>
         <a:p>
           <a:r>
-            <a:rPr lang="en-US"/>
+            <a:rPr lang="en-US" dirty="0"/>
             <a:t>HTML</a:t>
           </a:r>
         </a:p>
@@ -5093,7 +5093,7 @@
         <a:lstStyle/>
         <a:p>
           <a:r>
-            <a:rPr lang="en-US"/>
+            <a:rPr lang="en-US" dirty="0"/>
             <a:t>CSS</a:t>
           </a:r>
         </a:p>
@@ -5201,7 +5201,7 @@
         <a:lstStyle/>
         <a:p>
           <a:r>
-            <a:rPr lang="en-US"/>
+            <a:rPr lang="en-US" dirty="0"/>
             <a:t>Preferred </a:t>
           </a:r>
         </a:p>
@@ -5237,7 +5237,7 @@
         <a:lstStyle/>
         <a:p>
           <a:r>
-            <a:rPr lang="en-US"/>
+            <a:rPr lang="en-US" dirty="0"/>
             <a:t>ES6</a:t>
           </a:r>
         </a:p>
@@ -5273,7 +5273,7 @@
         <a:lstStyle/>
         <a:p>
           <a:r>
-            <a:rPr lang="en-US"/>
+            <a:rPr lang="en-US" dirty="0"/>
             <a:t>Command line</a:t>
           </a:r>
         </a:p>
@@ -5345,7 +5345,7 @@
         <a:lstStyle/>
         <a:p>
           <a:r>
-            <a:rPr lang="en-US"/>
+            <a:rPr lang="en-US" dirty="0"/>
             <a:t>Best</a:t>
           </a:r>
         </a:p>
@@ -5417,10 +5417,9 @@
         <a:lstStyle/>
         <a:p>
           <a:r>
-            <a:rPr lang="en-US"/>
+            <a:rPr lang="en-US" dirty="0"/>
             <a:t>Babel</a:t>
           </a:r>
-          <a:endParaRPr lang="en-US" dirty="0"/>
         </a:p>
       </dgm:t>
     </dgm:pt>
@@ -5592,10 +5591,9 @@
         <a:lstStyle/>
         <a:p>
           <a:r>
-            <a:rPr lang="en-US" dirty="0" err="1"/>
+            <a:rPr lang="en-US" dirty="0"/>
             <a:t>ReactDOM</a:t>
           </a:r>
-          <a:endParaRPr lang="en-US" dirty="0"/>
         </a:p>
       </dgm:t>
     </dgm:pt>
@@ -5629,7 +5627,7 @@
         <a:lstStyle/>
         <a:p>
           <a:r>
-            <a:rPr lang="en-US"/>
+            <a:rPr lang="en-US" dirty="0"/>
             <a:t>render()</a:t>
           </a:r>
         </a:p>
@@ -5665,7 +5663,7 @@
         <a:lstStyle/>
         <a:p>
           <a:r>
-            <a:rPr lang="en-US"/>
+            <a:rPr lang="en-US" dirty="0"/>
             <a:t>React</a:t>
           </a:r>
         </a:p>
@@ -5747,7 +5745,7 @@
             <a:t>.</a:t>
           </a:r>
           <a:r>
-            <a:rPr lang="en-US" dirty="0" err="1">
+            <a:rPr lang="en-US" dirty="0">
               <a:solidFill>
                 <a:schemeClr val="tx1"/>
               </a:solidFill>
@@ -5755,7 +5753,7 @@
             <a:t>create</a:t>
           </a:r>
           <a:r>
-            <a:rPr lang="en-US" dirty="0" err="1">
+            <a:rPr lang="en-US" dirty="0">
               <a:solidFill>
                 <a:schemeClr val="accent1">
                   <a:lumMod val="75000"/>
@@ -6007,7 +6005,7 @@
         <a:lstStyle/>
         <a:p>
           <a:r>
-            <a:rPr lang="en-US"/>
+            <a:rPr lang="en-US" dirty="0"/>
             <a:t>Element</a:t>
           </a:r>
         </a:p>
@@ -6043,7 +6041,7 @@
         <a:lstStyle/>
         <a:p>
           <a:r>
-            <a:rPr lang="en-US"/>
+            <a:rPr lang="en-US" dirty="0"/>
             <a:t>Describes DOM Element</a:t>
           </a:r>
         </a:p>
@@ -6079,7 +6077,7 @@
         <a:lstStyle/>
         <a:p>
           <a:r>
-            <a:rPr lang="en-US"/>
+            <a:rPr lang="en-US" dirty="0"/>
             <a:t>Object</a:t>
           </a:r>
         </a:p>
@@ -6115,7 +6113,7 @@
         <a:lstStyle/>
         <a:p>
           <a:r>
-            <a:rPr lang="en-US"/>
+            <a:rPr lang="en-US" dirty="0"/>
             <a:t>Component</a:t>
           </a:r>
         </a:p>
@@ -6151,7 +6149,7 @@
         <a:lstStyle/>
         <a:p>
           <a:r>
-            <a:rPr lang="en-US"/>
+            <a:rPr lang="en-US" dirty="0"/>
             <a:t>Independent/Reusable</a:t>
           </a:r>
         </a:p>
@@ -6187,7 +6185,7 @@
         <a:lstStyle/>
         <a:p>
           <a:r>
-            <a:rPr lang="en-US"/>
+            <a:rPr lang="en-US" dirty="0"/>
             <a:t>Parameters =&gt; React Element</a:t>
           </a:r>
         </a:p>
@@ -6223,7 +6221,7 @@
         <a:lstStyle/>
         <a:p>
           <a:r>
-            <a:rPr lang="en-US"/>
+            <a:rPr lang="en-US" dirty="0"/>
             <a:t>Function/Class</a:t>
           </a:r>
         </a:p>
@@ -6364,7 +6362,7 @@
         <a:lstStyle/>
         <a:p>
           <a:r>
-            <a:rPr lang="en-US"/>
+            <a:rPr lang="en-US" dirty="0"/>
             <a:t>JavaScript XML</a:t>
           </a:r>
         </a:p>
@@ -6436,7 +6434,7 @@
         <a:lstStyle/>
         <a:p>
           <a:r>
-            <a:rPr lang="en-US"/>
+            <a:rPr lang="en-US" dirty="0"/>
             <a:t>Transpile</a:t>
           </a:r>
         </a:p>
@@ -6472,7 +6470,7 @@
         <a:lstStyle/>
         <a:p>
           <a:r>
-            <a:rPr lang="en-US"/>
+            <a:rPr lang="en-US" dirty="0"/>
             <a:t>JavaScript</a:t>
           </a:r>
         </a:p>
@@ -6508,7 +6506,7 @@
         <a:lstStyle/>
         <a:p>
           <a:r>
-            <a:rPr lang="en-US"/>
+            <a:rPr lang="en-US" dirty="0"/>
             <a:t>Capitalize</a:t>
           </a:r>
         </a:p>
@@ -6544,7 +6542,7 @@
         <a:lstStyle/>
         <a:p>
           <a:r>
-            <a:rPr lang="en-US"/>
+            <a:rPr lang="en-US" dirty="0"/>
             <a:t>Visual</a:t>
           </a:r>
         </a:p>
@@ -6580,7 +6578,7 @@
         <a:lstStyle/>
         <a:p>
           <a:r>
-            <a:rPr lang="en-US"/>
+            <a:rPr lang="en-US" dirty="0"/>
             <a:t>{ }</a:t>
           </a:r>
         </a:p>
@@ -6616,7 +6614,7 @@
         <a:lstStyle/>
         <a:p>
           <a:r>
-            <a:rPr lang="en-US"/>
+            <a:rPr lang="en-US" dirty="0"/>
             <a:t>JS attributes</a:t>
           </a:r>
         </a:p>
@@ -6812,16 +6810,16 @@
         <a:lstStyle/>
         <a:p>
           <a:r>
-            <a:rPr lang="en-US" b="1">
+            <a:rPr lang="en-US" b="1" dirty="0">
               <a:hlinkClick xmlns:r="http://schemas.openxmlformats.org/officeDocument/2006/relationships" r:id="rId1"/>
             </a:rPr>
             <a:t>https://reactjs.org</a:t>
           </a:r>
           <a:r>
-            <a:rPr lang="en-US" b="1"/>
+            <a:rPr lang="en-US" b="1" dirty="0"/>
             <a:t> </a:t>
           </a:r>
-          <a:endParaRPr lang="en-US"/>
+          <a:endParaRPr lang="en-US" dirty="0"/>
         </a:p>
       </dgm:t>
     </dgm:pt>
@@ -6855,16 +6853,16 @@
         <a:lstStyle/>
         <a:p>
           <a:r>
-            <a:rPr lang="en-US" b="1">
+            <a:rPr lang="en-US" b="1" dirty="0">
               <a:hlinkClick xmlns:r="http://schemas.openxmlformats.org/officeDocument/2006/relationships" r:id="rId2"/>
             </a:rPr>
             <a:t>https://medium.freecodecamp.org/learn-react-js-in-5-minutes-526472d292f4</a:t>
           </a:r>
           <a:r>
-            <a:rPr lang="en-US" b="1"/>
+            <a:rPr lang="en-US" b="1" dirty="0"/>
             <a:t> </a:t>
           </a:r>
-          <a:endParaRPr lang="en-US"/>
+          <a:endParaRPr lang="en-US" dirty="0"/>
         </a:p>
       </dgm:t>
     </dgm:pt>
@@ -7093,7 +7091,7 @@
             <a:buNone/>
           </a:pPr>
           <a:r>
-            <a:rPr lang="en-US" sz="2200" kern="1200"/>
+            <a:rPr lang="en-US" sz="2200" kern="1200" dirty="0"/>
             <a:t>React?</a:t>
           </a:r>
         </a:p>
@@ -7972,10 +7970,9 @@
             <a:buNone/>
           </a:pPr>
           <a:r>
-            <a:rPr lang="en-US" sz="1700" kern="1200"/>
+            <a:rPr lang="en-US" sz="1700" kern="1200" dirty="0"/>
             <a:t>Babel</a:t>
           </a:r>
-          <a:endParaRPr lang="en-US" sz="1700" kern="1200" dirty="0"/>
         </a:p>
       </dsp:txBody>
       <dsp:txXfrm>
@@ -8282,7 +8279,7 @@
             <a:t>.</a:t>
           </a:r>
           <a:r>
-            <a:rPr lang="en-US" sz="1900" kern="1200" dirty="0" err="1">
+            <a:rPr lang="en-US" sz="1900" kern="1200" dirty="0">
               <a:solidFill>
                 <a:schemeClr val="tx1"/>
               </a:solidFill>
@@ -8290,7 +8287,7 @@
             <a:t>create</a:t>
           </a:r>
           <a:r>
-            <a:rPr lang="en-US" sz="1900" kern="1200" dirty="0" err="1">
+            <a:rPr lang="en-US" sz="1900" kern="1200" dirty="0">
               <a:solidFill>
                 <a:schemeClr val="accent1">
                   <a:lumMod val="75000"/>
@@ -8417,7 +8414,7 @@
             <a:buNone/>
           </a:pPr>
           <a:r>
-            <a:rPr lang="en-US" sz="2400" kern="1200"/>
+            <a:rPr lang="en-US" sz="2400" kern="1200" dirty="0"/>
             <a:t>React</a:t>
           </a:r>
         </a:p>
@@ -8499,7 +8496,7 @@
             <a:buNone/>
           </a:pPr>
           <a:r>
-            <a:rPr lang="en-US" sz="1900" kern="1200"/>
+            <a:rPr lang="en-US" sz="1900" kern="1200" dirty="0"/>
             <a:t>render()</a:t>
           </a:r>
         </a:p>
@@ -8576,10 +8573,9 @@
             <a:buNone/>
           </a:pPr>
           <a:r>
-            <a:rPr lang="en-US" sz="2400" kern="1200" dirty="0" err="1"/>
+            <a:rPr lang="en-US" sz="2400" kern="1200" dirty="0"/>
             <a:t>ReactDOM</a:t>
           </a:r>
-          <a:endParaRPr lang="en-US" sz="2400" kern="1200" dirty="0"/>
         </a:p>
       </dsp:txBody>
       <dsp:txXfrm>
@@ -9980,16 +9976,16 @@
             <a:buNone/>
           </a:pPr>
           <a:r>
-            <a:rPr lang="en-US" sz="1900" b="1" kern="1200">
+            <a:rPr lang="en-US" sz="1900" b="1" kern="1200" dirty="0">
               <a:hlinkClick xmlns:r="http://schemas.openxmlformats.org/officeDocument/2006/relationships" r:id="rId1"/>
             </a:rPr>
             <a:t>https://reactjs.org</a:t>
           </a:r>
           <a:r>
-            <a:rPr lang="en-US" sz="1900" b="1" kern="1200"/>
+            <a:rPr lang="en-US" sz="1900" b="1" kern="1200" dirty="0"/>
             <a:t> </a:t>
           </a:r>
-          <a:endParaRPr lang="en-US" sz="1900" kern="1200"/>
+          <a:endParaRPr lang="en-US" sz="1900" kern="1200" dirty="0"/>
         </a:p>
       </dsp:txBody>
       <dsp:txXfrm>
@@ -10116,16 +10112,16 @@
             <a:buNone/>
           </a:pPr>
           <a:r>
-            <a:rPr lang="en-US" sz="1900" b="1" kern="1200">
+            <a:rPr lang="en-US" sz="1900" b="1" kern="1200" dirty="0">
               <a:hlinkClick xmlns:r="http://schemas.openxmlformats.org/officeDocument/2006/relationships" r:id="rId2"/>
             </a:rPr>
             <a:t>https://medium.freecodecamp.org/learn-react-js-in-5-minutes-526472d292f4</a:t>
           </a:r>
           <a:r>
-            <a:rPr lang="en-US" sz="1900" b="1" kern="1200"/>
+            <a:rPr lang="en-US" sz="1900" b="1" kern="1200" dirty="0"/>
             <a:t> </a:t>
           </a:r>
-          <a:endParaRPr lang="en-US" sz="1900" kern="1200"/>
+          <a:endParaRPr lang="en-US" sz="1900" kern="1200" dirty="0"/>
         </a:p>
       </dsp:txBody>
       <dsp:txXfrm>
@@ -18013,7 +18009,7 @@
             </a:lvl1pPr>
           </a:lstStyle>
           <a:p>
-            <a:endParaRPr lang="en-US"/>
+            <a:endParaRPr lang="en-US" dirty="0"/>
           </a:p>
         </p:txBody>
       </p:sp>
@@ -18046,9 +18042,9 @@
           <a:p>
             <a:fld id="{A5C20BB3-3CCB-4FE5-991B-82F6BCB48AF3}" type="datetimeFigureOut">
               <a:rPr lang="en-US" smtClean="0"/>
-              <a:t>8/25/18</a:t>
+              <a:t>8/28/18</a:t>
             </a:fld>
-            <a:endParaRPr lang="en-US"/>
+            <a:endParaRPr lang="en-US" dirty="0"/>
           </a:p>
         </p:txBody>
       </p:sp>
@@ -18081,7 +18077,7 @@
           <a:bodyPr vert="horz" lIns="91440" tIns="45720" rIns="91440" bIns="45720" rtlCol="0" anchor="ctr"/>
           <a:lstStyle/>
           <a:p>
-            <a:endParaRPr lang="en-US"/>
+            <a:endParaRPr lang="en-US" dirty="0"/>
           </a:p>
         </p:txBody>
       </p:sp>
@@ -18171,7 +18167,7 @@
             </a:lvl1pPr>
           </a:lstStyle>
           <a:p>
-            <a:endParaRPr lang="en-US"/>
+            <a:endParaRPr lang="en-US" dirty="0"/>
           </a:p>
         </p:txBody>
       </p:sp>
@@ -18206,7 +18202,7 @@
               <a:rPr lang="en-US" smtClean="0"/>
               <a:t>‹#›</a:t>
             </a:fld>
-            <a:endParaRPr lang="en-US"/>
+            <a:endParaRPr lang="en-US" dirty="0"/>
           </a:p>
         </p:txBody>
       </p:sp>
@@ -27105,8 +27101,8 @@
           </a:lstStyle>
           <a:p>
             <a:fld id="{6AD6EE87-EBD5-4F12-A48A-63ACA297AC8F}" type="datetimeFigureOut">
-              <a:rPr lang="en-US" dirty="0"/>
-              <a:t>8/25/18</a:t>
+              <a:rPr lang="en-US"/>
+              <a:t>8/28/18</a:t>
             </a:fld>
             <a:endParaRPr lang="en-US" dirty="0"/>
           </a:p>
@@ -27147,7 +27143,7 @@
           <a:lstStyle/>
           <a:p>
             <a:fld id="{4FAB73BC-B049-4115-A692-8D63A059BFB8}" type="slidenum">
-              <a:rPr lang="en-US" dirty="0"/>
+              <a:rPr lang="en-US"/>
               <a:t>‹#›</a:t>
             </a:fld>
             <a:endParaRPr lang="en-US" dirty="0"/>
@@ -27312,8 +27308,8 @@
           <a:lstStyle/>
           <a:p>
             <a:fld id="{4CD73815-2707-4475-8F1A-B873CB631BB4}" type="datetimeFigureOut">
-              <a:rPr lang="en-US" dirty="0"/>
-              <a:t>8/25/18</a:t>
+              <a:rPr lang="en-US"/>
+              <a:t>8/28/18</a:t>
             </a:fld>
             <a:endParaRPr lang="en-US" dirty="0"/>
           </a:p>
@@ -27354,7 +27350,7 @@
           <a:lstStyle/>
           <a:p>
             <a:fld id="{4FAB73BC-B049-4115-A692-8D63A059BFB8}" type="slidenum">
-              <a:rPr lang="en-US" dirty="0"/>
+              <a:rPr lang="en-US"/>
               <a:t>‹#›</a:t>
             </a:fld>
             <a:endParaRPr lang="en-US" dirty="0"/>
@@ -27492,8 +27488,8 @@
           <a:lstStyle/>
           <a:p>
             <a:fld id="{2A4AFB99-0EAB-4182-AFF8-E214C82A68F6}" type="datetimeFigureOut">
-              <a:rPr lang="en-US" dirty="0"/>
-              <a:t>8/25/18</a:t>
+              <a:rPr lang="en-US"/>
+              <a:t>8/28/18</a:t>
             </a:fld>
             <a:endParaRPr lang="en-US" dirty="0"/>
           </a:p>
@@ -27534,7 +27530,7 @@
           <a:lstStyle/>
           <a:p>
             <a:fld id="{4FAB73BC-B049-4115-A692-8D63A059BFB8}" type="slidenum">
-              <a:rPr lang="en-US" dirty="0"/>
+              <a:rPr lang="en-US"/>
               <a:t>‹#›</a:t>
             </a:fld>
             <a:endParaRPr lang="en-US" dirty="0"/>
@@ -27697,8 +27693,8 @@
           <a:lstStyle/>
           <a:p>
             <a:fld id="{A5D3794B-289A-4A80-97D7-111025398D45}" type="datetimeFigureOut">
-              <a:rPr lang="en-US" dirty="0"/>
-              <a:t>8/25/18</a:t>
+              <a:rPr lang="en-US"/>
+              <a:t>8/28/18</a:t>
             </a:fld>
             <a:endParaRPr lang="en-US" dirty="0"/>
           </a:p>
@@ -27739,7 +27735,7 @@
           <a:lstStyle/>
           <a:p>
             <a:fld id="{4FAB73BC-B049-4115-A692-8D63A059BFB8}" type="slidenum">
-              <a:rPr lang="en-US" dirty="0"/>
+              <a:rPr lang="en-US"/>
               <a:t>‹#›</a:t>
             </a:fld>
             <a:endParaRPr lang="en-US" dirty="0"/>
@@ -36595,8 +36591,8 @@
           <a:lstStyle/>
           <a:p>
             <a:fld id="{5A61015F-7CC6-4D0A-9D87-873EA4C304CC}" type="datetimeFigureOut">
-              <a:rPr lang="en-US" dirty="0"/>
-              <a:t>8/25/18</a:t>
+              <a:rPr lang="en-US"/>
+              <a:t>8/28/18</a:t>
             </a:fld>
             <a:endParaRPr lang="en-US" dirty="0"/>
           </a:p>
@@ -36637,7 +36633,7 @@
           <a:lstStyle/>
           <a:p>
             <a:fld id="{4FAB73BC-B049-4115-A692-8D63A059BFB8}" type="slidenum">
-              <a:rPr lang="en-US" dirty="0"/>
+              <a:rPr lang="en-US"/>
               <a:t>‹#›</a:t>
             </a:fld>
             <a:endParaRPr lang="en-US" dirty="0"/>
@@ -36869,8 +36865,8 @@
           <a:lstStyle/>
           <a:p>
             <a:fld id="{93C6A301-0538-44EC-B09D-202E1042A48B}" type="datetimeFigureOut">
-              <a:rPr lang="en-US" dirty="0"/>
-              <a:t>8/25/18</a:t>
+              <a:rPr lang="en-US"/>
+              <a:t>8/28/18</a:t>
             </a:fld>
             <a:endParaRPr lang="en-US" dirty="0"/>
           </a:p>
@@ -36911,7 +36907,7 @@
           <a:lstStyle/>
           <a:p>
             <a:fld id="{4FAB73BC-B049-4115-A692-8D63A059BFB8}" type="slidenum">
-              <a:rPr lang="en-US" dirty="0"/>
+              <a:rPr lang="en-US"/>
               <a:t>‹#›</a:t>
             </a:fld>
             <a:endParaRPr lang="en-US" dirty="0"/>
@@ -37267,8 +37263,8 @@
           <a:lstStyle/>
           <a:p>
             <a:fld id="{D789574A-8875-45EF-8EA2-3CAA0F7ABC4C}" type="datetimeFigureOut">
-              <a:rPr lang="en-US" dirty="0"/>
-              <a:t>8/25/18</a:t>
+              <a:rPr lang="en-US"/>
+              <a:t>8/28/18</a:t>
             </a:fld>
             <a:endParaRPr lang="en-US" dirty="0"/>
           </a:p>
@@ -37309,7 +37305,7 @@
           <a:lstStyle/>
           <a:p>
             <a:fld id="{4FAB73BC-B049-4115-A692-8D63A059BFB8}" type="slidenum">
-              <a:rPr lang="en-US" dirty="0"/>
+              <a:rPr lang="en-US"/>
               <a:t>‹#›</a:t>
             </a:fld>
             <a:endParaRPr lang="en-US" dirty="0"/>
@@ -37385,8 +37381,8 @@
           <a:lstStyle/>
           <a:p>
             <a:fld id="{67EF4D4C-5367-4C26-9E2B-D8088D7FCA81}" type="datetimeFigureOut">
-              <a:rPr lang="en-US" dirty="0"/>
-              <a:t>8/25/18</a:t>
+              <a:rPr lang="en-US"/>
+              <a:t>8/28/18</a:t>
             </a:fld>
             <a:endParaRPr lang="en-US" dirty="0"/>
           </a:p>
@@ -37427,7 +37423,7 @@
           <a:lstStyle/>
           <a:p>
             <a:fld id="{4FAB73BC-B049-4115-A692-8D63A059BFB8}" type="slidenum">
-              <a:rPr lang="en-US" dirty="0"/>
+              <a:rPr lang="en-US"/>
               <a:t>‹#›</a:t>
             </a:fld>
             <a:endParaRPr lang="en-US" dirty="0"/>
@@ -37480,8 +37476,8 @@
           <a:lstStyle/>
           <a:p>
             <a:fld id="{56E91E96-98B0-4413-9547-46F3504108EF}" type="datetimeFigureOut">
-              <a:rPr lang="en-US" dirty="0"/>
-              <a:t>8/25/18</a:t>
+              <a:rPr lang="en-US"/>
+              <a:t>8/28/18</a:t>
             </a:fld>
             <a:endParaRPr lang="en-US" dirty="0"/>
           </a:p>
@@ -37522,7 +37518,7 @@
           <a:lstStyle/>
           <a:p>
             <a:fld id="{4FAB73BC-B049-4115-A692-8D63A059BFB8}" type="slidenum">
-              <a:rPr lang="en-US" dirty="0"/>
+              <a:rPr lang="en-US"/>
               <a:t>‹#›</a:t>
             </a:fld>
             <a:endParaRPr lang="en-US" dirty="0"/>
@@ -37770,8 +37766,8 @@
           <a:lstStyle/>
           <a:p>
             <a:fld id="{05C68B11-C5A8-448C-8CE9-B1A273C79CFC}" type="datetimeFigureOut">
-              <a:rPr lang="en-US" dirty="0"/>
-              <a:t>8/25/18</a:t>
+              <a:rPr lang="en-US"/>
+              <a:t>8/28/18</a:t>
             </a:fld>
             <a:endParaRPr lang="en-US" dirty="0"/>
           </a:p>
@@ -37812,7 +37808,7 @@
           <a:lstStyle/>
           <a:p>
             <a:fld id="{4FAB73BC-B049-4115-A692-8D63A059BFB8}" type="slidenum">
-              <a:rPr lang="en-US" dirty="0"/>
+              <a:rPr lang="en-US"/>
               <a:t>‹#›</a:t>
             </a:fld>
             <a:endParaRPr lang="en-US" dirty="0"/>
@@ -37947,10 +37943,9 @@
           </a:lstStyle>
           <a:p>
             <a:r>
-              <a:rPr lang="en-US"/>
+              <a:rPr lang="en-US" dirty="0"/>
               <a:t>Click icon to add picture</a:t>
             </a:r>
-            <a:endParaRPr lang="en-US" dirty="0"/>
           </a:p>
         </p:txBody>
       </p:sp>
@@ -38050,8 +38045,8 @@
           <a:lstStyle/>
           <a:p>
             <a:fld id="{C7616CA0-919D-4A49-9C8A-62FDFB3A5183}" type="datetimeFigureOut">
-              <a:rPr lang="en-US" dirty="0"/>
-              <a:t>8/25/18</a:t>
+              <a:rPr lang="en-US"/>
+              <a:t>8/28/18</a:t>
             </a:fld>
             <a:endParaRPr lang="en-US" dirty="0"/>
           </a:p>
@@ -38092,7 +38087,7 @@
           <a:lstStyle/>
           <a:p>
             <a:fld id="{867E5644-1E61-4311-A31E-84CB9C7AA8A9}" type="slidenum">
-              <a:rPr lang="en-US" dirty="0"/>
+              <a:rPr lang="en-US"/>
               <a:t>‹#›</a:t>
             </a:fld>
             <a:endParaRPr lang="en-US" dirty="0"/>
@@ -38300,9 +38295,9 @@
           </a:lstStyle>
           <a:p>
             <a:fld id="{90298CD5-6C1E-4009-B41F-6DF62E31D3BE}" type="datetimeFigureOut">
-              <a:rPr lang="en-US" dirty="0"/>
+              <a:rPr lang="en-US"/>
               <a:pPr/>
-              <a:t>8/25/18</a:t>
+              <a:t>8/28/18</a:t>
             </a:fld>
             <a:endParaRPr lang="en-US" dirty="0"/>
           </a:p>
@@ -38383,7 +38378,7 @@
           </a:lstStyle>
           <a:p>
             <a:fld id="{4FAB73BC-B049-4115-A692-8D63A059BFB8}" type="slidenum">
-              <a:rPr lang="en-US" dirty="0"/>
+              <a:rPr lang="en-US"/>
               <a:pPr/>
               <a:t>‹#›</a:t>
             </a:fld>
@@ -38872,7 +38867,7 @@
           <a:lstStyle/>
           <a:p>
             <a:pPr algn="ctr"/>
-            <a:endParaRPr lang="en-US"/>
+            <a:endParaRPr lang="en-US" dirty="0"/>
           </a:p>
         </p:txBody>
       </p:sp>
@@ -38899,7 +38894,7 @@
           <a:lstStyle/>
           <a:p>
             <a:r>
-              <a:rPr lang="en-US">
+              <a:rPr lang="en-US" dirty="0">
                 <a:solidFill>
                   <a:srgbClr val="FFFFFF"/>
                 </a:solidFill>
@@ -39154,7 +39149,7 @@
           <a:lstStyle/>
           <a:p>
             <a:pPr algn="ctr"/>
-            <a:endParaRPr lang="en-US"/>
+            <a:endParaRPr lang="en-US" dirty="0"/>
           </a:p>
         </p:txBody>
       </p:sp>
@@ -39217,7 +39212,7 @@
           <a:lstStyle/>
           <a:p>
             <a:pPr algn="ctr"/>
-            <a:endParaRPr lang="en-US"/>
+            <a:endParaRPr lang="en-US" dirty="0"/>
           </a:p>
         </p:txBody>
       </p:sp>
@@ -39250,7 +39245,7 @@
           <a:lstStyle/>
           <a:p>
             <a:r>
-              <a:rPr lang="en-US">
+              <a:rPr lang="en-US" dirty="0">
                 <a:solidFill>
                   <a:srgbClr val="FFFFFF"/>
                 </a:solidFill>
@@ -39481,7 +39476,7 @@
           <a:lstStyle/>
           <a:p>
             <a:pPr algn="ctr"/>
-            <a:endParaRPr lang="en-US"/>
+            <a:endParaRPr lang="en-US" dirty="0"/>
           </a:p>
         </p:txBody>
       </p:sp>
@@ -39544,7 +39539,7 @@
           <a:lstStyle/>
           <a:p>
             <a:pPr algn="ctr"/>
-            <a:endParaRPr lang="en-US"/>
+            <a:endParaRPr lang="en-US" dirty="0"/>
           </a:p>
         </p:txBody>
       </p:sp>
@@ -39571,12 +39566,12 @@
           <a:lstStyle/>
           <a:p>
             <a:r>
-              <a:rPr lang="en-US">
+              <a:rPr lang="en-US" dirty="0">
                 <a:solidFill>
                   <a:srgbClr val="FFFFFF"/>
                 </a:solidFill>
               </a:rPr>
-              <a:t>Contents</a:t>
+              <a:t>Content</a:t>
             </a:r>
           </a:p>
         </p:txBody>
@@ -39760,7 +39755,7 @@
           <a:lstStyle/>
           <a:p>
             <a:pPr algn="ctr"/>
-            <a:endParaRPr lang="en-US"/>
+            <a:endParaRPr lang="en-US" dirty="0"/>
           </a:p>
         </p:txBody>
       </p:sp>
@@ -40359,7 +40354,7 @@
           <a:lstStyle/>
           <a:p>
             <a:pPr algn="ctr"/>
-            <a:endParaRPr lang="en-US"/>
+            <a:endParaRPr lang="en-US" dirty="0"/>
           </a:p>
         </p:txBody>
       </p:sp>
@@ -40422,7 +40417,7 @@
           <a:lstStyle/>
           <a:p>
             <a:pPr algn="ctr"/>
-            <a:endParaRPr lang="en-US"/>
+            <a:endParaRPr lang="en-US" dirty="0"/>
           </a:p>
         </p:txBody>
       </p:sp>
@@ -40518,7 +40513,7 @@
           <a:lstStyle/>
           <a:p>
             <a:pPr algn="ctr"/>
-            <a:endParaRPr lang="en-US"/>
+            <a:endParaRPr lang="en-US" dirty="0"/>
           </a:p>
         </p:txBody>
       </p:sp>
@@ -40584,7 +40579,7 @@
           <a:lstStyle/>
           <a:p>
             <a:pPr algn="ctr"/>
-            <a:endParaRPr lang="en-US"/>
+            <a:endParaRPr lang="en-US" dirty="0"/>
           </a:p>
         </p:txBody>
       </p:sp>
@@ -40647,7 +40642,7 @@
           <a:lstStyle/>
           <a:p>
             <a:pPr algn="ctr"/>
-            <a:endParaRPr lang="en-US"/>
+            <a:endParaRPr lang="en-US" dirty="0"/>
           </a:p>
         </p:txBody>
       </p:sp>
@@ -40930,7 +40925,7 @@
           <a:lstStyle/>
           <a:p>
             <a:pPr algn="ctr"/>
-            <a:endParaRPr lang="en-US"/>
+            <a:endParaRPr lang="en-US" dirty="0"/>
           </a:p>
         </p:txBody>
       </p:sp>
@@ -41023,21 +41018,8 @@
                   <a:srgbClr val="FFFFFF"/>
                 </a:solidFill>
               </a:rPr>
-              <a:t>react-</a:t>
+              <a:t>react-dom</a:t>
             </a:r>
-            <a:r>
-              <a:rPr lang="en-US" sz="3200" u="sng" dirty="0" err="1">
-                <a:solidFill>
-                  <a:srgbClr val="FFFFFF"/>
-                </a:solidFill>
-              </a:rPr>
-              <a:t>dom</a:t>
-            </a:r>
-            <a:endParaRPr lang="en-US" sz="3200" u="sng" dirty="0">
-              <a:solidFill>
-                <a:srgbClr val="FFFFFF"/>
-              </a:solidFill>
-            </a:endParaRPr>
           </a:p>
           <a:p>
             <a:r>
@@ -41320,7 +41302,7 @@
           <a:lstStyle/>
           <a:p>
             <a:pPr algn="ctr"/>
-            <a:endParaRPr lang="en-US"/>
+            <a:endParaRPr lang="en-US" dirty="0"/>
           </a:p>
         </p:txBody>
       </p:sp>
@@ -41383,7 +41365,7 @@
           <a:lstStyle/>
           <a:p>
             <a:pPr algn="ctr"/>
-            <a:endParaRPr lang="en-US"/>
+            <a:endParaRPr lang="en-US" dirty="0"/>
           </a:p>
         </p:txBody>
       </p:sp>
@@ -41546,15 +41528,7 @@
             </a:pPr>
             <a:r>
               <a:rPr lang="en-US" sz="3600" dirty="0"/>
-              <a:t>ES6 class extends || .</a:t>
-            </a:r>
-            <a:r>
-              <a:rPr lang="en-US" sz="3600" dirty="0" err="1"/>
-              <a:t>createClass</a:t>
-            </a:r>
-            <a:r>
-              <a:rPr lang="en-US" sz="3600" dirty="0"/>
-              <a:t>()</a:t>
+              <a:t>ES6 class extends || .createClass()</a:t>
             </a:r>
           </a:p>
         </p:txBody>
@@ -41594,15 +41568,7 @@
             </a:pPr>
             <a:r>
               <a:rPr lang="en-US" sz="3600" dirty="0"/>
-              <a:t>.</a:t>
-            </a:r>
-            <a:r>
-              <a:rPr lang="en-US" sz="3600" dirty="0" err="1"/>
-              <a:t>createElement</a:t>
-            </a:r>
-            <a:r>
-              <a:rPr lang="en-US" sz="3600" dirty="0"/>
-              <a:t>(type, [props], […children])</a:t>
+              <a:t>.createElement(type, {props}, […children])</a:t>
             </a:r>
           </a:p>
         </p:txBody>
@@ -41642,23 +41608,7 @@
             </a:pPr>
             <a:r>
               <a:rPr lang="en-US" sz="3600" dirty="0"/>
-              <a:t>.map() | .</a:t>
-            </a:r>
-            <a:r>
-              <a:rPr lang="en-US" sz="3600" dirty="0" err="1"/>
-              <a:t>forEach</a:t>
-            </a:r>
-            <a:r>
-              <a:rPr lang="en-US" sz="3600" dirty="0"/>
-              <a:t>() | .count() | </a:t>
-            </a:r>
-            <a:r>
-              <a:rPr lang="en-US" sz="3600" dirty="0" err="1"/>
-              <a:t>toArray</a:t>
-            </a:r>
-            <a:r>
-              <a:rPr lang="en-US" sz="3600" dirty="0"/>
-              <a:t>()</a:t>
+              <a:t>.map() | .forEach() | .count() | toArray()</a:t>
             </a:r>
           </a:p>
         </p:txBody>
@@ -41738,13 +41688,8 @@
             </a:pPr>
             <a:r>
               <a:rPr lang="en-US" sz="3600" dirty="0"/>
-              <a:t>Enclose elements w/o </a:t>
+              <a:t>Enclose elements w/o creating another</a:t>
             </a:r>
-            <a:r>
-              <a:rPr lang="en-US" sz="3600"/>
-              <a:t>creating another</a:t>
-            </a:r>
-            <a:endParaRPr lang="en-US" sz="3600" dirty="0"/>
           </a:p>
         </p:txBody>
       </p:sp>
@@ -42279,7 +42224,7 @@
           <a:lstStyle/>
           <a:p>
             <a:pPr algn="ctr"/>
-            <a:endParaRPr lang="en-US"/>
+            <a:endParaRPr lang="en-US" dirty="0"/>
           </a:p>
         </p:txBody>
       </p:sp>
@@ -42342,7 +42287,7 @@
           <a:lstStyle/>
           <a:p>
             <a:pPr algn="ctr"/>
-            <a:endParaRPr lang="en-US"/>
+            <a:endParaRPr lang="en-US" dirty="0"/>
           </a:p>
         </p:txBody>
       </p:sp>
@@ -42566,7 +42511,7 @@
           <a:lstStyle/>
           <a:p>
             <a:pPr algn="ctr"/>
-            <a:endParaRPr lang="en-US"/>
+            <a:endParaRPr lang="en-US" dirty="0"/>
           </a:p>
         </p:txBody>
       </p:sp>
@@ -42629,7 +42574,7 @@
           <a:lstStyle/>
           <a:p>
             <a:pPr algn="ctr"/>
-            <a:endParaRPr lang="en-US"/>
+            <a:endParaRPr lang="en-US" dirty="0"/>
           </a:p>
         </p:txBody>
       </p:sp>
@@ -42656,7 +42601,7 @@
           <a:lstStyle/>
           <a:p>
             <a:r>
-              <a:rPr lang="en-US">
+              <a:rPr lang="en-US" dirty="0">
                 <a:solidFill>
                   <a:srgbClr val="FFFFFF"/>
                 </a:solidFill>

</xml_diff>